<commit_message>
tests and update presentation
</commit_message>
<xml_diff>
--- a/Starget.pptx
+++ b/Starget.pptx
@@ -123,7 +123,148 @@
       </a:defRPr>
     </a:lvl9pPr>
   </p:defaultTextStyle>
+  <p:extLst>
+    <p:ext uri="{EFAFB233-063F-42B5-8137-9DF3F51BA10A}">
+      <p15:sldGuideLst xmlns:p15="http://schemas.microsoft.com/office/powerpoint/2012/main"/>
+    </p:ext>
+  </p:extLst>
 </p:presentation>
+</file>
+
+<file path=ppt/commentAuthors.xml><?xml version="1.0" encoding="utf-8"?>
+<p:cmAuthorLst xmlns:a="http://schemas.openxmlformats.org/drawingml/2006/main" xmlns:r="http://schemas.openxmlformats.org/officeDocument/2006/relationships" xmlns:p="http://schemas.openxmlformats.org/presentationml/2006/main">
+  <p:cmAuthor id="1" name="Sylvain Brocas" initials="SB" lastIdx="11" clrIdx="0">
+    <p:extLst>
+      <p:ext uri="{19B8F6BF-5375-455C-9EA6-DF929625EA0E}">
+        <p15:presenceInfo xmlns:p15="http://schemas.microsoft.com/office/powerpoint/2012/main" userId="S::bros2671@usherbrooke.ca::5056907d-4ca8-496f-94c3-6e95c255b928" providerId="AD"/>
+      </p:ext>
+    </p:extLst>
+  </p:cmAuthor>
+</p:cmAuthorLst>
+</file>
+
+<file path=ppt/comments/comment1.xml><?xml version="1.0" encoding="utf-8"?>
+<p:cmLst xmlns:a="http://schemas.openxmlformats.org/drawingml/2006/main" xmlns:r="http://schemas.openxmlformats.org/officeDocument/2006/relationships" xmlns:p="http://schemas.openxmlformats.org/presentationml/2006/main">
+  <p:cm authorId="1" dt="2025-01-10T17:15:50.426" idx="1">
+    <p:pos x="10" y="10"/>
+    <p:text>mettre en forme la diapo titre avec le logo, le texte</p:text>
+    <p:extLst>
+      <p:ext uri="{C676402C-5697-4E1C-873F-D02D1690AC5C}">
+        <p15:threadingInfo xmlns:p15="http://schemas.microsoft.com/office/powerpoint/2012/main" timeZoneBias="300"/>
+      </p:ext>
+    </p:extLst>
+  </p:cm>
+  <p:cm authorId="1" dt="2025-01-10T17:17:32.376" idx="5">
+    <p:pos x="146" y="146"/>
+    <p:text>ajouter charte graphique eos</p:text>
+    <p:extLst>
+      <p:ext uri="{C676402C-5697-4E1C-873F-D02D1690AC5C}">
+        <p15:threadingInfo xmlns:p15="http://schemas.microsoft.com/office/powerpoint/2012/main" timeZoneBias="300"/>
+      </p:ext>
+    </p:extLst>
+  </p:cm>
+</p:cmLst>
+</file>
+
+<file path=ppt/comments/comment2.xml><?xml version="1.0" encoding="utf-8"?>
+<p:cmLst xmlns:a="http://schemas.openxmlformats.org/drawingml/2006/main" xmlns:r="http://schemas.openxmlformats.org/officeDocument/2006/relationships" xmlns:p="http://schemas.openxmlformats.org/presentationml/2006/main">
+  <p:cm authorId="1" dt="2025-01-10T17:16:22.842" idx="2">
+    <p:pos x="10" y="10"/>
+    <p:text>Ajouter CG(charte graphique)Eos</p:text>
+    <p:extLst>
+      <p:ext uri="{C676402C-5697-4E1C-873F-D02D1690AC5C}">
+        <p15:threadingInfo xmlns:p15="http://schemas.microsoft.com/office/powerpoint/2012/main" timeZoneBias="300"/>
+      </p:ext>
+    </p:extLst>
+  </p:cm>
+  <p:cm authorId="1" dt="2025-01-10T17:17:02.703" idx="3">
+    <p:pos x="146" y="146"/>
+    <p:text>Mettre en forme et en couleur+police le texte</p:text>
+    <p:extLst>
+      <p:ext uri="{C676402C-5697-4E1C-873F-D02D1690AC5C}">
+        <p15:threadingInfo xmlns:p15="http://schemas.microsoft.com/office/powerpoint/2012/main" timeZoneBias="300"/>
+      </p:ext>
+    </p:extLst>
+  </p:cm>
+  <p:cm authorId="1" dt="2025-01-10T17:17:13.646" idx="4">
+    <p:pos x="282" y="282"/>
+    <p:text>Eventuellement simplifier le texte</p:text>
+    <p:extLst>
+      <p:ext uri="{C676402C-5697-4E1C-873F-D02D1690AC5C}">
+        <p15:threadingInfo xmlns:p15="http://schemas.microsoft.com/office/powerpoint/2012/main" timeZoneBias="300"/>
+      </p:ext>
+    </p:extLst>
+  </p:cm>
+</p:cmLst>
+</file>
+
+<file path=ppt/comments/comment3.xml><?xml version="1.0" encoding="utf-8"?>
+<p:cmLst xmlns:a="http://schemas.openxmlformats.org/drawingml/2006/main" xmlns:r="http://schemas.openxmlformats.org/officeDocument/2006/relationships" xmlns:p="http://schemas.openxmlformats.org/presentationml/2006/main">
+  <p:cm authorId="1" dt="2025-01-10T17:18:01.109" idx="6">
+    <p:pos x="10" y="10"/>
+    <p:text>utiliser CG eos</p:text>
+    <p:extLst>
+      <p:ext uri="{C676402C-5697-4E1C-873F-D02D1690AC5C}">
+        <p15:threadingInfo xmlns:p15="http://schemas.microsoft.com/office/powerpoint/2012/main" timeZoneBias="300"/>
+      </p:ext>
+    </p:extLst>
+  </p:cm>
+  <p:cm authorId="1" dt="2025-01-10T17:18:09.539" idx="7">
+    <p:pos x="146" y="146"/>
+    <p:text>mettre en forme le texte et mise en page adaptee avec l'image</p:text>
+    <p:extLst>
+      <p:ext uri="{C676402C-5697-4E1C-873F-D02D1690AC5C}">
+        <p15:threadingInfo xmlns:p15="http://schemas.microsoft.com/office/powerpoint/2012/main" timeZoneBias="300"/>
+      </p:ext>
+    </p:extLst>
+  </p:cm>
+</p:cmLst>
+</file>
+
+<file path=ppt/comments/comment4.xml><?xml version="1.0" encoding="utf-8"?>
+<p:cmLst xmlns:a="http://schemas.openxmlformats.org/drawingml/2006/main" xmlns:r="http://schemas.openxmlformats.org/officeDocument/2006/relationships" xmlns:p="http://schemas.openxmlformats.org/presentationml/2006/main">
+  <p:cm authorId="1" dt="2025-01-10T17:18:30.127" idx="8">
+    <p:pos x="10" y="10"/>
+    <p:text>ajouter CG Eos</p:text>
+    <p:extLst>
+      <p:ext uri="{C676402C-5697-4E1C-873F-D02D1690AC5C}">
+        <p15:threadingInfo xmlns:p15="http://schemas.microsoft.com/office/powerpoint/2012/main" timeZoneBias="300"/>
+      </p:ext>
+    </p:extLst>
+  </p:cm>
+  <p:cm authorId="1" dt="2025-01-10T17:18:37.117" idx="9">
+    <p:pos x="146" y="146"/>
+    <p:text>Pour le reste, slides en cours, ne pas toucher</p:text>
+    <p:extLst>
+      <p:ext uri="{C676402C-5697-4E1C-873F-D02D1690AC5C}">
+        <p15:threadingInfo xmlns:p15="http://schemas.microsoft.com/office/powerpoint/2012/main" timeZoneBias="300"/>
+      </p:ext>
+    </p:extLst>
+  </p:cm>
+</p:cmLst>
+</file>
+
+<file path=ppt/comments/comment5.xml><?xml version="1.0" encoding="utf-8"?>
+<p:cmLst xmlns:a="http://schemas.openxmlformats.org/drawingml/2006/main" xmlns:r="http://schemas.openxmlformats.org/officeDocument/2006/relationships" xmlns:p="http://schemas.openxmlformats.org/presentationml/2006/main">
+  <p:cm authorId="1" dt="2025-01-10T17:18:53.908" idx="10">
+    <p:pos x="10" y="10"/>
+    <p:text>ajouter CG Eos</p:text>
+    <p:extLst>
+      <p:ext uri="{C676402C-5697-4E1C-873F-D02D1690AC5C}">
+        <p15:threadingInfo xmlns:p15="http://schemas.microsoft.com/office/powerpoint/2012/main" timeZoneBias="300"/>
+      </p:ext>
+    </p:extLst>
+  </p:cm>
+  <p:cm authorId="1" dt="2025-01-10T17:19:02.860" idx="11">
+    <p:pos x="146" y="146"/>
+    <p:text/>
+    <p:extLst>
+      <p:ext uri="{C676402C-5697-4E1C-873F-D02D1690AC5C}">
+        <p15:threadingInfo xmlns:p15="http://schemas.microsoft.com/office/powerpoint/2012/main" timeZoneBias="300"/>
+      </p:ext>
+    </p:extLst>
+  </p:cm>
+</p:cmLst>
 </file>
 
 <file path=ppt/slideLayouts/slideLayout1.xml><?xml version="1.0" encoding="utf-8"?>
@@ -169,12 +310,16 @@
           <a:bodyPr anchor="b"/>
           <a:lstStyle>
             <a:lvl1pPr algn="ctr">
-              <a:defRPr sz="6000"/>
+              <a:defRPr sz="6000">
+                <a:solidFill>
+                  <a:srgbClr val="2A1944"/>
+                </a:solidFill>
+              </a:defRPr>
             </a:lvl1pPr>
           </a:lstStyle>
           <a:p>
             <a:r>
-              <a:rPr lang="fr-FR"/>
+              <a:rPr lang="fr-FR" dirty="0"/>
               <a:t>Modifiez le style du titre</a:t>
             </a:r>
           </a:p>
@@ -207,7 +352,11 @@
           <a:lstStyle>
             <a:lvl1pPr marL="0" indent="0" algn="ctr">
               <a:buNone/>
-              <a:defRPr sz="2400"/>
+              <a:defRPr sz="2400">
+                <a:solidFill>
+                  <a:srgbClr val="EDBA3A"/>
+                </a:solidFill>
+              </a:defRPr>
             </a:lvl1pPr>
             <a:lvl2pPr marL="457200" indent="0" algn="ctr">
               <a:buNone/>
@@ -244,7 +393,7 @@
           </a:lstStyle>
           <a:p>
             <a:r>
-              <a:rPr lang="fr-FR"/>
+              <a:rPr lang="fr-FR" dirty="0"/>
               <a:t>Modifiez le style des sous-titres du masque</a:t>
             </a:r>
           </a:p>
@@ -273,7 +422,7 @@
           <a:p>
             <a:fld id="{60594D4F-5E57-4149-BAAA-4D9B717B0EC4}" type="datetimeFigureOut">
               <a:rPr lang="fr-FR" smtClean="0"/>
-              <a:t>09/01/2025</a:t>
+              <a:t>10/01/2025</a:t>
             </a:fld>
             <a:endParaRPr lang="fr-FR"/>
           </a:p>
@@ -471,7 +620,7 @@
           <a:p>
             <a:fld id="{60594D4F-5E57-4149-BAAA-4D9B717B0EC4}" type="datetimeFigureOut">
               <a:rPr lang="fr-FR" smtClean="0"/>
-              <a:t>09/01/2025</a:t>
+              <a:t>10/01/2025</a:t>
             </a:fld>
             <a:endParaRPr lang="fr-FR"/>
           </a:p>
@@ -679,7 +828,7 @@
           <a:p>
             <a:fld id="{60594D4F-5E57-4149-BAAA-4D9B717B0EC4}" type="datetimeFigureOut">
               <a:rPr lang="fr-FR" smtClean="0"/>
-              <a:t>09/01/2025</a:t>
+              <a:t>10/01/2025</a:t>
             </a:fld>
             <a:endParaRPr lang="fr-FR"/>
           </a:p>
@@ -788,10 +937,18 @@
         <p:spPr/>
         <p:txBody>
           <a:bodyPr/>
-          <a:lstStyle/>
-          <a:p>
-            <a:r>
-              <a:rPr lang="fr-FR"/>
+          <a:lstStyle>
+            <a:lvl1pPr>
+              <a:defRPr>
+                <a:solidFill>
+                  <a:srgbClr val="2A1944"/>
+                </a:solidFill>
+              </a:defRPr>
+            </a:lvl1pPr>
+          </a:lstStyle>
+          <a:p>
+            <a:r>
+              <a:rPr lang="fr-FR" dirty="0"/>
               <a:t>Modifiez le style du titre</a:t>
             </a:r>
           </a:p>
@@ -816,39 +973,83 @@
         <p:spPr/>
         <p:txBody>
           <a:bodyPr/>
-          <a:lstStyle/>
+          <a:lstStyle>
+            <a:lvl1pPr>
+              <a:defRPr>
+                <a:solidFill>
+                  <a:srgbClr val="EDBA3A"/>
+                </a:solidFill>
+              </a:defRPr>
+            </a:lvl1pPr>
+            <a:lvl2pPr>
+              <a:defRPr>
+                <a:solidFill>
+                  <a:schemeClr val="bg1">
+                    <a:lumMod val="50000"/>
+                  </a:schemeClr>
+                </a:solidFill>
+              </a:defRPr>
+            </a:lvl2pPr>
+            <a:lvl3pPr>
+              <a:defRPr>
+                <a:solidFill>
+                  <a:schemeClr val="bg1">
+                    <a:lumMod val="50000"/>
+                  </a:schemeClr>
+                </a:solidFill>
+              </a:defRPr>
+            </a:lvl3pPr>
+            <a:lvl4pPr>
+              <a:defRPr>
+                <a:solidFill>
+                  <a:schemeClr val="bg1">
+                    <a:lumMod val="50000"/>
+                  </a:schemeClr>
+                </a:solidFill>
+              </a:defRPr>
+            </a:lvl4pPr>
+            <a:lvl5pPr>
+              <a:defRPr>
+                <a:solidFill>
+                  <a:schemeClr val="bg1">
+                    <a:lumMod val="50000"/>
+                  </a:schemeClr>
+                </a:solidFill>
+              </a:defRPr>
+            </a:lvl5pPr>
+          </a:lstStyle>
           <a:p>
             <a:pPr lvl="0"/>
             <a:r>
-              <a:rPr lang="fr-FR"/>
+              <a:rPr lang="fr-FR" dirty="0"/>
               <a:t>Cliquez pour modifier les styles du texte du masque</a:t>
             </a:r>
           </a:p>
           <a:p>
             <a:pPr lvl="1"/>
             <a:r>
-              <a:rPr lang="fr-FR"/>
+              <a:rPr lang="fr-FR" dirty="0"/>
               <a:t>Deuxième niveau</a:t>
             </a:r>
           </a:p>
           <a:p>
             <a:pPr lvl="2"/>
             <a:r>
-              <a:rPr lang="fr-FR"/>
+              <a:rPr lang="fr-FR" dirty="0"/>
               <a:t>Troisième niveau</a:t>
             </a:r>
           </a:p>
           <a:p>
             <a:pPr lvl="3"/>
             <a:r>
-              <a:rPr lang="fr-FR"/>
+              <a:rPr lang="fr-FR" dirty="0"/>
               <a:t>Quatrième niveau</a:t>
             </a:r>
           </a:p>
           <a:p>
             <a:pPr lvl="4"/>
             <a:r>
-              <a:rPr lang="fr-FR"/>
+              <a:rPr lang="fr-FR" dirty="0"/>
               <a:t>Cinquième niveau</a:t>
             </a:r>
           </a:p>
@@ -877,7 +1078,7 @@
           <a:p>
             <a:fld id="{60594D4F-5E57-4149-BAAA-4D9B717B0EC4}" type="datetimeFigureOut">
               <a:rPr lang="fr-FR" smtClean="0"/>
-              <a:t>09/01/2025</a:t>
+              <a:t>10/01/2025</a:t>
             </a:fld>
             <a:endParaRPr lang="fr-FR"/>
           </a:p>
@@ -993,12 +1194,16 @@
           <a:bodyPr anchor="b"/>
           <a:lstStyle>
             <a:lvl1pPr>
-              <a:defRPr sz="6000"/>
+              <a:defRPr sz="6000">
+                <a:solidFill>
+                  <a:srgbClr val="2A1944"/>
+                </a:solidFill>
+              </a:defRPr>
             </a:lvl1pPr>
           </a:lstStyle>
           <a:p>
             <a:r>
-              <a:rPr lang="fr-FR"/>
+              <a:rPr lang="fr-FR" dirty="0"/>
               <a:t>Modifiez le style du titre</a:t>
             </a:r>
           </a:p>
@@ -1033,9 +1238,7 @@
               <a:buNone/>
               <a:defRPr sz="2400">
                 <a:solidFill>
-                  <a:schemeClr val="tx1">
-                    <a:tint val="75000"/>
-                  </a:schemeClr>
+                  <a:srgbClr val="EDBA3A"/>
                 </a:solidFill>
               </a:defRPr>
             </a:lvl1pPr>
@@ -1123,7 +1326,7 @@
           <a:p>
             <a:pPr lvl="0"/>
             <a:r>
-              <a:rPr lang="fr-FR"/>
+              <a:rPr lang="fr-FR" dirty="0"/>
               <a:t>Cliquez pour modifier les styles du texte du masque</a:t>
             </a:r>
           </a:p>
@@ -1152,7 +1355,7 @@
           <a:p>
             <a:fld id="{60594D4F-5E57-4149-BAAA-4D9B717B0EC4}" type="datetimeFigureOut">
               <a:rPr lang="fr-FR" smtClean="0"/>
-              <a:t>09/01/2025</a:t>
+              <a:t>10/01/2025</a:t>
             </a:fld>
             <a:endParaRPr lang="fr-FR"/>
           </a:p>
@@ -1417,7 +1620,7 @@
           <a:p>
             <a:fld id="{60594D4F-5E57-4149-BAAA-4D9B717B0EC4}" type="datetimeFigureOut">
               <a:rPr lang="fr-FR" smtClean="0"/>
-              <a:t>09/01/2025</a:t>
+              <a:t>10/01/2025</a:t>
             </a:fld>
             <a:endParaRPr lang="fr-FR"/>
           </a:p>
@@ -1491,7 +1694,7 @@
 </file>
 
 <file path=ppt/slideLayouts/slideLayout5.xml><?xml version="1.0" encoding="utf-8"?>
-<p:sldLayout xmlns:a="http://schemas.openxmlformats.org/drawingml/2006/main" xmlns:r="http://schemas.openxmlformats.org/officeDocument/2006/relationships" xmlns:p="http://schemas.openxmlformats.org/presentationml/2006/main" type="twoTxTwoObj" preserve="1">
+<p:sldLayout xmlns:a="http://schemas.openxmlformats.org/drawingml/2006/main" xmlns:r="http://schemas.openxmlformats.org/officeDocument/2006/relationships" xmlns:p="http://schemas.openxmlformats.org/presentationml/2006/main" preserve="1" userDrawn="1">
   <p:cSld name="Comparaison">
     <p:spTree>
       <p:nvGrpSpPr>
@@ -1509,57 +1712,24 @@
       </p:grpSpPr>
       <p:sp>
         <p:nvSpPr>
-          <p:cNvPr id="2" name="Titre 1">
-            <a:extLst>
-              <a:ext uri="{FF2B5EF4-FFF2-40B4-BE49-F238E27FC236}">
-                <a16:creationId xmlns:a16="http://schemas.microsoft.com/office/drawing/2014/main" id="{3E5D26E0-0E29-AD41-E0C6-06D5E993321F}"/>
-              </a:ext>
-            </a:extLst>
-          </p:cNvPr>
-          <p:cNvSpPr>
-            <a:spLocks noGrp="1"/>
-          </p:cNvSpPr>
-          <p:nvPr>
-            <p:ph type="title"/>
+          <p:cNvPr id="3" name="Espace réservé du texte 2">
+            <a:extLst>
+              <a:ext uri="{FF2B5EF4-FFF2-40B4-BE49-F238E27FC236}">
+                <a16:creationId xmlns:a16="http://schemas.microsoft.com/office/drawing/2014/main" id="{F8F62E80-A7C9-C194-B417-5404705A765E}"/>
+              </a:ext>
+            </a:extLst>
+          </p:cNvPr>
+          <p:cNvSpPr>
+            <a:spLocks noGrp="1"/>
+          </p:cNvSpPr>
+          <p:nvPr>
+            <p:ph type="body" idx="1"/>
           </p:nvPr>
         </p:nvSpPr>
         <p:spPr>
           <a:xfrm>
-            <a:off x="839788" y="365125"/>
-            <a:ext cx="10515600" cy="1325563"/>
-          </a:xfrm>
-        </p:spPr>
-        <p:txBody>
-          <a:bodyPr/>
-          <a:lstStyle/>
-          <a:p>
-            <a:r>
-              <a:rPr lang="fr-FR"/>
-              <a:t>Modifiez le style du titre</a:t>
-            </a:r>
-          </a:p>
-        </p:txBody>
-      </p:sp>
-      <p:sp>
-        <p:nvSpPr>
-          <p:cNvPr id="3" name="Espace réservé du texte 2">
-            <a:extLst>
-              <a:ext uri="{FF2B5EF4-FFF2-40B4-BE49-F238E27FC236}">
-                <a16:creationId xmlns:a16="http://schemas.microsoft.com/office/drawing/2014/main" id="{F8F62E80-A7C9-C194-B417-5404705A765E}"/>
-              </a:ext>
-            </a:extLst>
-          </p:cNvPr>
-          <p:cNvSpPr>
-            <a:spLocks noGrp="1"/>
-          </p:cNvSpPr>
-          <p:nvPr>
-            <p:ph type="body" idx="1"/>
-          </p:nvPr>
-        </p:nvSpPr>
-        <p:spPr>
-          <a:xfrm>
-            <a:off x="839788" y="1681163"/>
-            <a:ext cx="5157787" cy="823912"/>
+            <a:off x="839788" y="1750515"/>
+            <a:ext cx="5157787" cy="754560"/>
           </a:xfrm>
         </p:spPr>
         <p:txBody>
@@ -1605,7 +1775,7 @@
           <a:p>
             <a:pPr lvl="0"/>
             <a:r>
-              <a:rPr lang="fr-FR"/>
+              <a:rPr lang="fr-FR" dirty="0"/>
               <a:t>Cliquez pour modifier les styles du texte du masque</a:t>
             </a:r>
           </a:p>
@@ -1691,8 +1861,8 @@
         </p:nvSpPr>
         <p:spPr>
           <a:xfrm>
-            <a:off x="6172200" y="1681163"/>
-            <a:ext cx="5183188" cy="823912"/>
+            <a:off x="6172200" y="1750515"/>
+            <a:ext cx="5183188" cy="754560"/>
           </a:xfrm>
         </p:spPr>
         <p:txBody>
@@ -1829,7 +1999,7 @@
           <a:p>
             <a:fld id="{60594D4F-5E57-4149-BAAA-4D9B717B0EC4}" type="datetimeFigureOut">
               <a:rPr lang="fr-FR" smtClean="0"/>
-              <a:t>09/01/2025</a:t>
+              <a:t>10/01/2025</a:t>
             </a:fld>
             <a:endParaRPr lang="fr-FR"/>
           </a:p>
@@ -1886,6 +2056,60 @@
               <a:t>‹N°›</a:t>
             </a:fld>
             <a:endParaRPr lang="fr-FR"/>
+          </a:p>
+        </p:txBody>
+      </p:sp>
+      <p:sp>
+        <p:nvSpPr>
+          <p:cNvPr id="12" name="Titre 1">
+            <a:extLst>
+              <a:ext uri="{FF2B5EF4-FFF2-40B4-BE49-F238E27FC236}">
+                <a16:creationId xmlns:a16="http://schemas.microsoft.com/office/drawing/2014/main" id="{E7145163-2250-4578-B1B9-A17DDC86B848}"/>
+              </a:ext>
+            </a:extLst>
+          </p:cNvPr>
+          <p:cNvSpPr txBox="1">
+            <a:spLocks/>
+          </p:cNvSpPr>
+          <p:nvPr userDrawn="1"/>
+        </p:nvSpPr>
+        <p:spPr>
+          <a:xfrm>
+            <a:off x="838200" y="965681"/>
+            <a:ext cx="10515600" cy="784834"/>
+          </a:xfrm>
+          <a:prstGeom prst="rect">
+            <a:avLst/>
+          </a:prstGeom>
+        </p:spPr>
+        <p:txBody>
+          <a:bodyPr vert="horz" lIns="91440" tIns="45720" rIns="91440" bIns="45720" rtlCol="0" anchor="ctr">
+            <a:normAutofit/>
+          </a:bodyPr>
+          <a:lstStyle>
+            <a:lvl1pPr algn="l" defTabSz="914400" rtl="0" eaLnBrk="1" latinLnBrk="0" hangingPunct="1">
+              <a:lnSpc>
+                <a:spcPct val="90000"/>
+              </a:lnSpc>
+              <a:spcBef>
+                <a:spcPct val="0"/>
+              </a:spcBef>
+              <a:buNone/>
+              <a:defRPr sz="4400" kern="1200">
+                <a:solidFill>
+                  <a:srgbClr val="2A1944"/>
+                </a:solidFill>
+                <a:latin typeface="Fugaz One" pitchFamily="2" charset="0"/>
+                <a:ea typeface="+mj-ea"/>
+                <a:cs typeface="+mj-cs"/>
+              </a:defRPr>
+            </a:lvl1pPr>
+          </a:lstStyle>
+          <a:p>
+            <a:r>
+              <a:rPr lang="fr-FR" dirty="0"/>
+              <a:t>Modifiez le style du titre</a:t>
+            </a:r>
           </a:p>
         </p:txBody>
       </p:sp>
@@ -1941,7 +2165,7 @@
           <a:lstStyle/>
           <a:p>
             <a:r>
-              <a:rPr lang="fr-FR"/>
+              <a:rPr lang="fr-FR" dirty="0"/>
               <a:t>Modifiez le style du titre</a:t>
             </a:r>
           </a:p>
@@ -1970,7 +2194,7 @@
           <a:p>
             <a:fld id="{60594D4F-5E57-4149-BAAA-4D9B717B0EC4}" type="datetimeFigureOut">
               <a:rPr lang="fr-FR" smtClean="0"/>
-              <a:t>09/01/2025</a:t>
+              <a:t>10/01/2025</a:t>
             </a:fld>
             <a:endParaRPr lang="fr-FR"/>
           </a:p>
@@ -2083,7 +2307,7 @@
           <a:p>
             <a:fld id="{60594D4F-5E57-4149-BAAA-4D9B717B0EC4}" type="datetimeFigureOut">
               <a:rPr lang="fr-FR" smtClean="0"/>
-              <a:t>09/01/2025</a:t>
+              <a:t>10/01/2025</a:t>
             </a:fld>
             <a:endParaRPr lang="fr-FR"/>
           </a:p>
@@ -2394,7 +2618,7 @@
           <a:p>
             <a:fld id="{60594D4F-5E57-4149-BAAA-4D9B717B0EC4}" type="datetimeFigureOut">
               <a:rPr lang="fr-FR" smtClean="0"/>
-              <a:t>09/01/2025</a:t>
+              <a:t>10/01/2025</a:t>
             </a:fld>
             <a:endParaRPr lang="fr-FR"/>
           </a:p>
@@ -2682,7 +2906,7 @@
           <a:p>
             <a:fld id="{60594D4F-5E57-4149-BAAA-4D9B717B0EC4}" type="datetimeFigureOut">
               <a:rPr lang="fr-FR" smtClean="0"/>
-              <a:t>09/01/2025</a:t>
+              <a:t>10/01/2025</a:t>
             </a:fld>
             <a:endParaRPr lang="fr-FR"/>
           </a:p>
@@ -2795,8 +3019,8 @@
         </p:nvSpPr>
         <p:spPr>
           <a:xfrm>
-            <a:off x="838200" y="365125"/>
-            <a:ext cx="10515600" cy="1325563"/>
+            <a:off x="838200" y="965681"/>
+            <a:ext cx="10515600" cy="784834"/>
           </a:xfrm>
           <a:prstGeom prst="rect">
             <a:avLst/>
@@ -2809,7 +3033,7 @@
           <a:lstStyle/>
           <a:p>
             <a:r>
-              <a:rPr lang="fr-FR"/>
+              <a:rPr lang="fr-FR" dirty="0"/>
               <a:t>Modifiez le style du titre</a:t>
             </a:r>
           </a:p>
@@ -2848,35 +3072,35 @@
           <a:p>
             <a:pPr lvl="0"/>
             <a:r>
-              <a:rPr lang="fr-FR"/>
+              <a:rPr lang="fr-FR" dirty="0"/>
               <a:t>Cliquez pour modifier les styles du texte du masque</a:t>
             </a:r>
           </a:p>
           <a:p>
             <a:pPr lvl="1"/>
             <a:r>
-              <a:rPr lang="fr-FR"/>
+              <a:rPr lang="fr-FR" dirty="0"/>
               <a:t>Deuxième niveau</a:t>
             </a:r>
           </a:p>
           <a:p>
             <a:pPr lvl="2"/>
             <a:r>
-              <a:rPr lang="fr-FR"/>
+              <a:rPr lang="fr-FR" dirty="0"/>
               <a:t>Troisième niveau</a:t>
             </a:r>
           </a:p>
           <a:p>
             <a:pPr lvl="3"/>
             <a:r>
-              <a:rPr lang="fr-FR"/>
+              <a:rPr lang="fr-FR" dirty="0"/>
               <a:t>Quatrième niveau</a:t>
             </a:r>
           </a:p>
           <a:p>
             <a:pPr lvl="4"/>
             <a:r>
-              <a:rPr lang="fr-FR"/>
+              <a:rPr lang="fr-FR" dirty="0"/>
               <a:t>Cinquième niveau</a:t>
             </a:r>
           </a:p>
@@ -2923,9 +3147,9 @@
           <a:p>
             <a:fld id="{60594D4F-5E57-4149-BAAA-4D9B717B0EC4}" type="datetimeFigureOut">
               <a:rPr lang="fr-FR" smtClean="0"/>
-              <a:t>09/01/2025</a:t>
+              <a:t>10/01/2025</a:t>
             </a:fld>
-            <a:endParaRPr lang="fr-FR"/>
+            <a:endParaRPr lang="fr-FR" dirty="0"/>
           </a:p>
         </p:txBody>
       </p:sp>
@@ -2968,7 +3192,10 @@
             </a:lvl1pPr>
           </a:lstStyle>
           <a:p>
-            <a:endParaRPr lang="fr-FR"/>
+            <a:r>
+              <a:rPr lang="fr-FR" dirty="0"/>
+              <a:t>Revue de projet - Eos</a:t>
+            </a:r>
           </a:p>
         </p:txBody>
       </p:sp>
@@ -3015,10 +3242,219 @@
               <a:rPr lang="fr-FR" smtClean="0"/>
               <a:t>‹N°›</a:t>
             </a:fld>
-            <a:endParaRPr lang="fr-FR"/>
-          </a:p>
-        </p:txBody>
-      </p:sp>
+            <a:endParaRPr lang="fr-FR" dirty="0"/>
+          </a:p>
+        </p:txBody>
+      </p:sp>
+      <p:sp>
+        <p:nvSpPr>
+          <p:cNvPr id="9" name="Forme libre : forme 8">
+            <a:extLst>
+              <a:ext uri="{FF2B5EF4-FFF2-40B4-BE49-F238E27FC236}">
+                <a16:creationId xmlns:a16="http://schemas.microsoft.com/office/drawing/2014/main" id="{02345001-35CC-4455-8470-398306B6926F}"/>
+              </a:ext>
+            </a:extLst>
+          </p:cNvPr>
+          <p:cNvSpPr/>
+          <p:nvPr userDrawn="1"/>
+        </p:nvSpPr>
+        <p:spPr>
+          <a:xfrm>
+            <a:off x="-37003" y="0"/>
+            <a:ext cx="12229003" cy="6858000"/>
+          </a:xfrm>
+          <a:custGeom>
+            <a:avLst/>
+            <a:gdLst>
+              <a:gd name="connsiteX0" fmla="*/ 626699 w 12229003"/>
+              <a:gd name="connsiteY0" fmla="*/ 175470 h 6858000"/>
+              <a:gd name="connsiteX1" fmla="*/ 313840 w 12229003"/>
+              <a:gd name="connsiteY1" fmla="*/ 488329 h 6858000"/>
+              <a:gd name="connsiteX2" fmla="*/ 313840 w 12229003"/>
+              <a:gd name="connsiteY2" fmla="*/ 6369672 h 6858000"/>
+              <a:gd name="connsiteX3" fmla="*/ 626699 w 12229003"/>
+              <a:gd name="connsiteY3" fmla="*/ 6682531 h 6858000"/>
+              <a:gd name="connsiteX4" fmla="*/ 11604198 w 12229003"/>
+              <a:gd name="connsiteY4" fmla="*/ 6682531 h 6858000"/>
+              <a:gd name="connsiteX5" fmla="*/ 11917057 w 12229003"/>
+              <a:gd name="connsiteY5" fmla="*/ 6369672 h 6858000"/>
+              <a:gd name="connsiteX6" fmla="*/ 11917057 w 12229003"/>
+              <a:gd name="connsiteY6" fmla="*/ 488329 h 6858000"/>
+              <a:gd name="connsiteX7" fmla="*/ 11604198 w 12229003"/>
+              <a:gd name="connsiteY7" fmla="*/ 175470 h 6858000"/>
+              <a:gd name="connsiteX8" fmla="*/ 0 w 12229003"/>
+              <a:gd name="connsiteY8" fmla="*/ 0 h 6858000"/>
+              <a:gd name="connsiteX9" fmla="*/ 12229003 w 12229003"/>
+              <a:gd name="connsiteY9" fmla="*/ 0 h 6858000"/>
+              <a:gd name="connsiteX10" fmla="*/ 12229003 w 12229003"/>
+              <a:gd name="connsiteY10" fmla="*/ 6858000 h 6858000"/>
+              <a:gd name="connsiteX11" fmla="*/ 0 w 12229003"/>
+              <a:gd name="connsiteY11" fmla="*/ 6858000 h 6858000"/>
+            </a:gdLst>
+            <a:ahLst/>
+            <a:cxnLst>
+              <a:cxn ang="0">
+                <a:pos x="connsiteX0" y="connsiteY0"/>
+              </a:cxn>
+              <a:cxn ang="0">
+                <a:pos x="connsiteX1" y="connsiteY1"/>
+              </a:cxn>
+              <a:cxn ang="0">
+                <a:pos x="connsiteX2" y="connsiteY2"/>
+              </a:cxn>
+              <a:cxn ang="0">
+                <a:pos x="connsiteX3" y="connsiteY3"/>
+              </a:cxn>
+              <a:cxn ang="0">
+                <a:pos x="connsiteX4" y="connsiteY4"/>
+              </a:cxn>
+              <a:cxn ang="0">
+                <a:pos x="connsiteX5" y="connsiteY5"/>
+              </a:cxn>
+              <a:cxn ang="0">
+                <a:pos x="connsiteX6" y="connsiteY6"/>
+              </a:cxn>
+              <a:cxn ang="0">
+                <a:pos x="connsiteX7" y="connsiteY7"/>
+              </a:cxn>
+              <a:cxn ang="0">
+                <a:pos x="connsiteX8" y="connsiteY8"/>
+              </a:cxn>
+              <a:cxn ang="0">
+                <a:pos x="connsiteX9" y="connsiteY9"/>
+              </a:cxn>
+              <a:cxn ang="0">
+                <a:pos x="connsiteX10" y="connsiteY10"/>
+              </a:cxn>
+              <a:cxn ang="0">
+                <a:pos x="connsiteX11" y="connsiteY11"/>
+              </a:cxn>
+            </a:cxnLst>
+            <a:rect l="l" t="t" r="r" b="b"/>
+            <a:pathLst>
+              <a:path w="12229003" h="6858000">
+                <a:moveTo>
+                  <a:pt x="626699" y="175470"/>
+                </a:moveTo>
+                <a:cubicBezTo>
+                  <a:pt x="453912" y="175470"/>
+                  <a:pt x="313840" y="315542"/>
+                  <a:pt x="313840" y="488329"/>
+                </a:cubicBezTo>
+                <a:lnTo>
+                  <a:pt x="313840" y="6369672"/>
+                </a:lnTo>
+                <a:cubicBezTo>
+                  <a:pt x="313840" y="6542459"/>
+                  <a:pt x="453912" y="6682531"/>
+                  <a:pt x="626699" y="6682531"/>
+                </a:cubicBezTo>
+                <a:lnTo>
+                  <a:pt x="11604198" y="6682531"/>
+                </a:lnTo>
+                <a:cubicBezTo>
+                  <a:pt x="11776985" y="6682531"/>
+                  <a:pt x="11917057" y="6542459"/>
+                  <a:pt x="11917057" y="6369672"/>
+                </a:cubicBezTo>
+                <a:lnTo>
+                  <a:pt x="11917057" y="488329"/>
+                </a:lnTo>
+                <a:cubicBezTo>
+                  <a:pt x="11917057" y="315542"/>
+                  <a:pt x="11776985" y="175470"/>
+                  <a:pt x="11604198" y="175470"/>
+                </a:cubicBezTo>
+                <a:close/>
+                <a:moveTo>
+                  <a:pt x="0" y="0"/>
+                </a:moveTo>
+                <a:lnTo>
+                  <a:pt x="12229003" y="0"/>
+                </a:lnTo>
+                <a:lnTo>
+                  <a:pt x="12229003" y="6858000"/>
+                </a:lnTo>
+                <a:lnTo>
+                  <a:pt x="0" y="6858000"/>
+                </a:lnTo>
+                <a:close/>
+              </a:path>
+            </a:pathLst>
+          </a:custGeom>
+          <a:solidFill>
+            <a:srgbClr val="E4DCFF"/>
+          </a:solidFill>
+          <a:ln>
+            <a:noFill/>
+          </a:ln>
+        </p:spPr>
+        <p:style>
+          <a:lnRef idx="2">
+            <a:schemeClr val="accent1">
+              <a:shade val="50000"/>
+            </a:schemeClr>
+          </a:lnRef>
+          <a:fillRef idx="1">
+            <a:schemeClr val="accent1"/>
+          </a:fillRef>
+          <a:effectRef idx="0">
+            <a:schemeClr val="accent1"/>
+          </a:effectRef>
+          <a:fontRef idx="minor">
+            <a:schemeClr val="lt1"/>
+          </a:fontRef>
+        </p:style>
+        <p:txBody>
+          <a:bodyPr wrap="square" rtlCol="0" anchor="ctr">
+            <a:noAutofit/>
+          </a:bodyPr>
+          <a:lstStyle/>
+          <a:p>
+            <a:pPr algn="ctr"/>
+            <a:endParaRPr lang="fr-CA"/>
+          </a:p>
+        </p:txBody>
+      </p:sp>
+      <p:pic>
+        <p:nvPicPr>
+          <p:cNvPr id="11" name="Graphique 10">
+            <a:extLst>
+              <a:ext uri="{FF2B5EF4-FFF2-40B4-BE49-F238E27FC236}">
+                <a16:creationId xmlns:a16="http://schemas.microsoft.com/office/drawing/2014/main" id="{86BDE079-CBC2-4EE8-B7C8-6757C541D7E9}"/>
+              </a:ext>
+            </a:extLst>
+          </p:cNvPr>
+          <p:cNvPicPr>
+            <a:picLocks noChangeAspect="1"/>
+          </p:cNvPicPr>
+          <p:nvPr userDrawn="1"/>
+        </p:nvPicPr>
+        <p:blipFill>
+          <a:blip r:embed="rId13">
+            <a:extLst>
+              <a:ext uri="{28A0092B-C50C-407E-A947-70E740481C1C}">
+                <a14:useLocalDpi xmlns:a14="http://schemas.microsoft.com/office/drawing/2010/main" val="0"/>
+              </a:ext>
+              <a:ext uri="{96DAC541-7B7A-43D3-8B79-37D633B846F1}">
+                <asvg:svgBlip xmlns:asvg="http://schemas.microsoft.com/office/drawing/2016/SVG/main" r:embed="rId14"/>
+              </a:ext>
+            </a:extLst>
+          </a:blip>
+          <a:stretch>
+            <a:fillRect/>
+          </a:stretch>
+        </p:blipFill>
+        <p:spPr>
+          <a:xfrm>
+            <a:off x="87298" y="136525"/>
+            <a:ext cx="1977295" cy="965201"/>
+          </a:xfrm>
+          <a:prstGeom prst="rect">
+            <a:avLst/>
+          </a:prstGeom>
+        </p:spPr>
+      </p:pic>
     </p:spTree>
     <p:extLst>
       <p:ext uri="{BB962C8B-B14F-4D97-AF65-F5344CB8AC3E}">
@@ -3052,67 +3488,71 @@
         <a:buNone/>
         <a:defRPr sz="4400" kern="1200">
           <a:solidFill>
-            <a:schemeClr val="tx1"/>
+            <a:srgbClr val="2A1944"/>
           </a:solidFill>
-          <a:latin typeface="+mj-lt"/>
+          <a:latin typeface="Fugaz One" pitchFamily="2" charset="0"/>
           <a:ea typeface="+mj-ea"/>
           <a:cs typeface="+mj-cs"/>
         </a:defRPr>
       </a:lvl1pPr>
     </p:titleStyle>
     <p:bodyStyle>
-      <a:lvl1pPr marL="228600" indent="-228600" algn="l" defTabSz="914400" rtl="0" eaLnBrk="1" latinLnBrk="0" hangingPunct="1">
+      <a:lvl1pPr marL="457200" indent="-457200" algn="l" defTabSz="914400" rtl="0" eaLnBrk="1" latinLnBrk="0" hangingPunct="1">
         <a:lnSpc>
           <a:spcPct val="90000"/>
         </a:lnSpc>
         <a:spcBef>
           <a:spcPts val="1000"/>
         </a:spcBef>
-        <a:buFont typeface="Arial" panose="020B0604020202020204" pitchFamily="34" charset="0"/>
-        <a:buChar char="•"/>
+        <a:buFont typeface="Wingdings" panose="05000000000000000000" pitchFamily="2" charset="2"/>
+        <a:buChar char="q"/>
         <a:defRPr sz="2800" kern="1200">
           <a:solidFill>
-            <a:schemeClr val="tx1"/>
+            <a:srgbClr val="FFC000"/>
           </a:solidFill>
-          <a:latin typeface="+mn-lt"/>
+          <a:latin typeface="Rubik" pitchFamily="2" charset="-79"/>
           <a:ea typeface="+mn-ea"/>
-          <a:cs typeface="+mn-cs"/>
+          <a:cs typeface="Rubik" pitchFamily="2" charset="-79"/>
         </a:defRPr>
       </a:lvl1pPr>
-      <a:lvl2pPr marL="685800" indent="-228600" algn="l" defTabSz="914400" rtl="0" eaLnBrk="1" latinLnBrk="0" hangingPunct="1">
+      <a:lvl2pPr marL="800100" indent="-342900" algn="l" defTabSz="914400" rtl="0" eaLnBrk="1" latinLnBrk="0" hangingPunct="1">
         <a:lnSpc>
           <a:spcPct val="90000"/>
         </a:lnSpc>
         <a:spcBef>
           <a:spcPts val="500"/>
         </a:spcBef>
-        <a:buFont typeface="Arial" panose="020B0604020202020204" pitchFamily="34" charset="0"/>
-        <a:buChar char="•"/>
+        <a:buFont typeface="Wingdings" panose="05000000000000000000" pitchFamily="2" charset="2"/>
+        <a:buChar char="Ø"/>
         <a:defRPr sz="2400" kern="1200">
           <a:solidFill>
-            <a:schemeClr val="tx1"/>
+            <a:schemeClr val="bg1">
+              <a:lumMod val="50000"/>
+            </a:schemeClr>
           </a:solidFill>
-          <a:latin typeface="+mn-lt"/>
+          <a:latin typeface="Rubik" pitchFamily="2" charset="-79"/>
           <a:ea typeface="+mn-ea"/>
-          <a:cs typeface="+mn-cs"/>
+          <a:cs typeface="Rubik" pitchFamily="2" charset="-79"/>
         </a:defRPr>
       </a:lvl2pPr>
-      <a:lvl3pPr marL="1143000" indent="-228600" algn="l" defTabSz="914400" rtl="0" eaLnBrk="1" latinLnBrk="0" hangingPunct="1">
+      <a:lvl3pPr marL="1257300" indent="-342900" algn="l" defTabSz="914400" rtl="0" eaLnBrk="1" latinLnBrk="0" hangingPunct="1">
         <a:lnSpc>
           <a:spcPct val="90000"/>
         </a:lnSpc>
         <a:spcBef>
           <a:spcPts val="500"/>
         </a:spcBef>
-        <a:buFont typeface="Arial" panose="020B0604020202020204" pitchFamily="34" charset="0"/>
-        <a:buChar char="•"/>
+        <a:buFont typeface="Courier New" panose="02070309020205020404" pitchFamily="49" charset="0"/>
+        <a:buChar char="o"/>
         <a:defRPr sz="2000" kern="1200">
           <a:solidFill>
-            <a:schemeClr val="tx1"/>
+            <a:schemeClr val="bg1">
+              <a:lumMod val="50000"/>
+            </a:schemeClr>
           </a:solidFill>
-          <a:latin typeface="+mn-lt"/>
+          <a:latin typeface="Rubik" pitchFamily="2" charset="-79"/>
           <a:ea typeface="+mn-ea"/>
-          <a:cs typeface="+mn-cs"/>
+          <a:cs typeface="Rubik" pitchFamily="2" charset="-79"/>
         </a:defRPr>
       </a:lvl3pPr>
       <a:lvl4pPr marL="1600200" indent="-228600" algn="l" defTabSz="914400" rtl="0" eaLnBrk="1" latinLnBrk="0" hangingPunct="1">
@@ -3126,11 +3566,13 @@
         <a:buChar char="•"/>
         <a:defRPr sz="1800" kern="1200">
           <a:solidFill>
-            <a:schemeClr val="tx1"/>
+            <a:schemeClr val="bg1">
+              <a:lumMod val="50000"/>
+            </a:schemeClr>
           </a:solidFill>
-          <a:latin typeface="+mn-lt"/>
+          <a:latin typeface="Rubik" pitchFamily="2" charset="-79"/>
           <a:ea typeface="+mn-ea"/>
-          <a:cs typeface="+mn-cs"/>
+          <a:cs typeface="Rubik" pitchFamily="2" charset="-79"/>
         </a:defRPr>
       </a:lvl4pPr>
       <a:lvl5pPr marL="2057400" indent="-228600" algn="l" defTabSz="914400" rtl="0" eaLnBrk="1" latinLnBrk="0" hangingPunct="1">
@@ -3144,11 +3586,13 @@
         <a:buChar char="•"/>
         <a:defRPr sz="1800" kern="1200">
           <a:solidFill>
-            <a:schemeClr val="tx1"/>
+            <a:schemeClr val="bg1">
+              <a:lumMod val="50000"/>
+            </a:schemeClr>
           </a:solidFill>
-          <a:latin typeface="+mn-lt"/>
+          <a:latin typeface="Rubik" pitchFamily="2" charset="-79"/>
           <a:ea typeface="+mn-ea"/>
-          <a:cs typeface="+mn-cs"/>
+          <a:cs typeface="Rubik" pitchFamily="2" charset="-79"/>
         </a:defRPr>
       </a:lvl5pPr>
       <a:lvl6pPr marL="2514600" indent="-228600" algn="l" defTabSz="914400" rtl="0" eaLnBrk="1" latinLnBrk="0" hangingPunct="1">
@@ -3431,7 +3875,7 @@
         </p:blipFill>
         <p:spPr>
           <a:xfrm>
-            <a:off x="128081" y="82247"/>
+            <a:off x="272937" y="2961249"/>
             <a:ext cx="3519791" cy="3519791"/>
           </a:xfrm>
           <a:prstGeom prst="rect">
@@ -3925,7 +4369,9 @@
         </p:nvSpPr>
         <p:spPr/>
         <p:txBody>
-          <a:bodyPr/>
+          <a:bodyPr>
+            <a:normAutofit fontScale="90000"/>
+          </a:bodyPr>
           <a:lstStyle/>
           <a:p>
             <a:r>
@@ -4049,7 +4495,9 @@
         </p:nvSpPr>
         <p:spPr/>
         <p:txBody>
-          <a:bodyPr/>
+          <a:bodyPr>
+            <a:normAutofit fontScale="90000"/>
+          </a:bodyPr>
           <a:lstStyle/>
           <a:p>
             <a:r>
@@ -4829,10 +5277,15 @@
             <p:ph idx="1"/>
           </p:nvPr>
         </p:nvSpPr>
-        <p:spPr/>
+        <p:spPr>
+          <a:xfrm>
+            <a:off x="838200" y="1825625"/>
+            <a:ext cx="9077346" cy="4351338"/>
+          </a:xfrm>
+        </p:spPr>
         <p:txBody>
           <a:bodyPr>
-            <a:normAutofit fontScale="92500"/>
+            <a:normAutofit fontScale="85000" lnSpcReduction="10000"/>
           </a:bodyPr>
           <a:lstStyle/>
           <a:p>
@@ -4846,7 +5299,7 @@
             </a:r>
             <a:r>
               <a:rPr lang="fr-FR" dirty="0"/>
-              <a:t> est un dispositif mécanique qui soutient et oriente un instrument d'observation, tel qu'un télescope ou une lunette, permettant de suivre avec précision les objets célestes malgré la rotation terrestre.</a:t>
+              <a:t> est un dispositif mécanique qui soutient et oriente un instrument d'observation (télescope, lunette, …), permettant de suivre avec précision les objets célestes malgré la rotation terrestre.</a:t>
             </a:r>
           </a:p>
           <a:p>
@@ -4894,6 +5347,176 @@
           </a:p>
         </p:txBody>
       </p:sp>
+      <p:grpSp>
+        <p:nvGrpSpPr>
+          <p:cNvPr id="4" name="Groupe 3">
+            <a:extLst>
+              <a:ext uri="{FF2B5EF4-FFF2-40B4-BE49-F238E27FC236}">
+                <a16:creationId xmlns:a16="http://schemas.microsoft.com/office/drawing/2014/main" id="{7514523F-79A7-48AB-A77E-60F4D42DEC45}"/>
+              </a:ext>
+            </a:extLst>
+          </p:cNvPr>
+          <p:cNvGrpSpPr/>
+          <p:nvPr/>
+        </p:nvGrpSpPr>
+        <p:grpSpPr>
+          <a:xfrm>
+            <a:off x="9223950" y="1189831"/>
+            <a:ext cx="2968050" cy="5622926"/>
+            <a:chOff x="4379398" y="-2041525"/>
+            <a:chExt cx="3971925" cy="7524751"/>
+          </a:xfrm>
+        </p:grpSpPr>
+        <p:pic>
+          <p:nvPicPr>
+            <p:cNvPr id="1026" name="Picture 2">
+              <a:extLst>
+                <a:ext uri="{FF2B5EF4-FFF2-40B4-BE49-F238E27FC236}">
+                  <a16:creationId xmlns:a16="http://schemas.microsoft.com/office/drawing/2014/main" id="{6F2C8763-9B56-4DCA-835D-2EA2096583AD}"/>
+                </a:ext>
+              </a:extLst>
+            </p:cNvPr>
+            <p:cNvPicPr>
+              <a:picLocks noChangeAspect="1" noChangeArrowheads="1"/>
+            </p:cNvPicPr>
+            <p:nvPr/>
+          </p:nvPicPr>
+          <p:blipFill>
+            <a:blip r:embed="rId2">
+              <a:extLst>
+                <a:ext uri="{28A0092B-C50C-407E-A947-70E740481C1C}">
+                  <a14:useLocalDpi xmlns:a14="http://schemas.microsoft.com/office/drawing/2010/main" val="0"/>
+                </a:ext>
+              </a:extLst>
+            </a:blip>
+            <a:srcRect/>
+            <a:stretch>
+              <a:fillRect/>
+            </a:stretch>
+          </p:blipFill>
+          <p:spPr bwMode="auto">
+            <a:xfrm>
+              <a:off x="4379398" y="-2041525"/>
+              <a:ext cx="3971925" cy="7524751"/>
+            </a:xfrm>
+            <a:prstGeom prst="rect">
+              <a:avLst/>
+            </a:prstGeom>
+            <a:noFill/>
+            <a:extLst>
+              <a:ext uri="{909E8E84-426E-40DD-AFC4-6F175D3DCCD1}">
+                <a14:hiddenFill xmlns:a14="http://schemas.microsoft.com/office/drawing/2010/main">
+                  <a:solidFill>
+                    <a:srgbClr val="FFFFFF"/>
+                  </a:solidFill>
+                </a14:hiddenFill>
+              </a:ext>
+            </a:extLst>
+          </p:spPr>
+        </p:pic>
+        <p:pic>
+          <p:nvPicPr>
+            <p:cNvPr id="1027" name="Picture 3">
+              <a:extLst>
+                <a:ext uri="{FF2B5EF4-FFF2-40B4-BE49-F238E27FC236}">
+                  <a16:creationId xmlns:a16="http://schemas.microsoft.com/office/drawing/2014/main" id="{458003CC-99AD-4692-B643-B02F720C3A44}"/>
+                </a:ext>
+              </a:extLst>
+            </p:cNvPr>
+            <p:cNvPicPr>
+              <a:picLocks noChangeAspect="1" noChangeArrowheads="1"/>
+            </p:cNvPicPr>
+            <p:nvPr/>
+          </p:nvPicPr>
+          <p:blipFill>
+            <a:blip r:embed="rId3">
+              <a:extLst>
+                <a:ext uri="{28A0092B-C50C-407E-A947-70E740481C1C}">
+                  <a14:useLocalDpi xmlns:a14="http://schemas.microsoft.com/office/drawing/2010/main" val="0"/>
+                </a:ext>
+              </a:extLst>
+            </a:blip>
+            <a:srcRect/>
+            <a:stretch>
+              <a:fillRect/>
+            </a:stretch>
+          </p:blipFill>
+          <p:spPr bwMode="auto">
+            <a:xfrm>
+              <a:off x="5304911" y="-258365"/>
+              <a:ext cx="2533650" cy="1971675"/>
+            </a:xfrm>
+            <a:prstGeom prst="rect">
+              <a:avLst/>
+            </a:prstGeom>
+            <a:noFill/>
+            <a:effectLst>
+              <a:glow rad="139700">
+                <a:schemeClr val="accent4">
+                  <a:satMod val="175000"/>
+                  <a:alpha val="40000"/>
+                </a:schemeClr>
+              </a:glow>
+            </a:effectLst>
+            <a:extLst>
+              <a:ext uri="{909E8E84-426E-40DD-AFC4-6F175D3DCCD1}">
+                <a14:hiddenFill xmlns:a14="http://schemas.microsoft.com/office/drawing/2010/main">
+                  <a:solidFill>
+                    <a:srgbClr val="FFFFFF"/>
+                  </a:solidFill>
+                </a14:hiddenFill>
+              </a:ext>
+            </a:extLst>
+          </p:spPr>
+        </p:pic>
+        <p:pic>
+          <p:nvPicPr>
+            <p:cNvPr id="1028" name="Picture 4">
+              <a:extLst>
+                <a:ext uri="{FF2B5EF4-FFF2-40B4-BE49-F238E27FC236}">
+                  <a16:creationId xmlns:a16="http://schemas.microsoft.com/office/drawing/2014/main" id="{4A1035B5-4887-461D-93A8-884AF5D65F47}"/>
+                </a:ext>
+              </a:extLst>
+            </p:cNvPr>
+            <p:cNvPicPr>
+              <a:picLocks noChangeAspect="1" noChangeArrowheads="1"/>
+            </p:cNvPicPr>
+            <p:nvPr/>
+          </p:nvPicPr>
+          <p:blipFill>
+            <a:blip r:embed="rId4">
+              <a:extLst>
+                <a:ext uri="{28A0092B-C50C-407E-A947-70E740481C1C}">
+                  <a14:useLocalDpi xmlns:a14="http://schemas.microsoft.com/office/drawing/2010/main" val="0"/>
+                </a:ext>
+              </a:extLst>
+            </a:blip>
+            <a:srcRect/>
+            <a:stretch>
+              <a:fillRect/>
+            </a:stretch>
+          </p:blipFill>
+          <p:spPr bwMode="auto">
+            <a:xfrm>
+              <a:off x="4379398" y="1089819"/>
+              <a:ext cx="3867150" cy="4381501"/>
+            </a:xfrm>
+            <a:prstGeom prst="rect">
+              <a:avLst/>
+            </a:prstGeom>
+            <a:noFill/>
+            <a:extLst>
+              <a:ext uri="{909E8E84-426E-40DD-AFC4-6F175D3DCCD1}">
+                <a14:hiddenFill xmlns:a14="http://schemas.microsoft.com/office/drawing/2010/main">
+                  <a:solidFill>
+                    <a:srgbClr val="FFFFFF"/>
+                  </a:solidFill>
+                </a14:hiddenFill>
+              </a:ext>
+            </a:extLst>
+          </p:spPr>
+        </p:pic>
+      </p:grpSp>
     </p:spTree>
     <p:extLst>
       <p:ext uri="{BB962C8B-B14F-4D97-AF65-F5344CB8AC3E}">
@@ -5338,7 +5961,7 @@
         <p:spPr/>
         <p:txBody>
           <a:bodyPr>
-            <a:normAutofit fontScale="92500" lnSpcReduction="10000"/>
+            <a:normAutofit fontScale="92500" lnSpcReduction="20000"/>
           </a:bodyPr>
           <a:lstStyle/>
           <a:p>

</xml_diff>